<commit_message>
updated for 9th class.
</commit_message>
<xml_diff>
--- a/lecture/2013/digital-document/20130606-Digital-Document-8.pptx
+++ b/lecture/2013/digital-document/20130606-Digital-Document-8.pptx
@@ -7312,7 +7312,7 @@
         </p:nvSpPr>
         <p:spPr>
           <a:xfrm>
-            <a:off x="323528" y="-171400"/>
+            <a:off x="323528" y="-315416"/>
             <a:ext cx="8496944" cy="1143000"/>
           </a:xfrm>
         </p:spPr>
@@ -7323,14 +7323,14 @@
           <a:lstStyle/>
           <a:p>
             <a:r>
-              <a:rPr lang="en-US" altLang="ja-JP" sz="3600" dirty="0" smtClean="0"/>
+              <a:rPr lang="en-US" altLang="ja-JP" sz="3200" dirty="0" smtClean="0"/>
               <a:t>HTML</a:t>
             </a:r>
             <a:r>
-              <a:rPr lang="ja-JP" altLang="en-US" sz="3600" dirty="0" smtClean="0"/>
+              <a:rPr lang="ja-JP" altLang="en-US" sz="3200" dirty="0" smtClean="0"/>
               <a:t>フォーマットによる文書例</a:t>
             </a:r>
-            <a:endParaRPr kumimoji="1" lang="ja-JP" altLang="en-US" sz="3600" dirty="0"/>
+            <a:endParaRPr kumimoji="1" lang="ja-JP" altLang="en-US" sz="3200" dirty="0"/>
           </a:p>
         </p:txBody>
       </p:sp>
@@ -7346,8 +7346,8 @@
         </p:nvSpPr>
         <p:spPr>
           <a:xfrm>
-            <a:off x="0" y="836712"/>
-            <a:ext cx="9144000" cy="6021288"/>
+            <a:off x="0" y="548680"/>
+            <a:ext cx="9144000" cy="6309320"/>
           </a:xfrm>
           <a:ln w="3175">
             <a:solidFill>
@@ -7554,6 +7554,11 @@
               </a:rPr>
               <a:t>&gt;</a:t>
             </a:r>
+            <a:endParaRPr lang="en-US" altLang="ja-JP" sz="2400" dirty="0" smtClean="0">
+              <a:solidFill>
+                <a:srgbClr val="FF0000"/>
+              </a:solidFill>
+            </a:endParaRPr>
           </a:p>
           <a:p>
             <a:pPr marL="0" indent="0">
@@ -7888,7 +7893,7 @@
               <a:t>）</a:t>
             </a:r>
             <a:r>
-              <a:rPr lang="en-US" altLang="ja-JP" sz="2000" dirty="0">
+              <a:rPr lang="en-US" altLang="ja-JP" sz="2400" dirty="0">
                 <a:solidFill>
                   <a:srgbClr val="FF0000"/>
                 </a:solidFill>
@@ -7896,7 +7901,7 @@
               <a:t>&lt;/li</a:t>
             </a:r>
             <a:r>
-              <a:rPr lang="en-US" altLang="ja-JP" sz="2000" dirty="0" smtClean="0">
+              <a:rPr lang="en-US" altLang="ja-JP" sz="2400" dirty="0" smtClean="0">
                 <a:solidFill>
                   <a:srgbClr val="FF0000"/>
                 </a:solidFill>
@@ -7942,31 +7947,43 @@
               <a:t>2</a:t>
             </a:r>
             <a:r>
-              <a:rPr lang="ja-JP" altLang="en-US" sz="2000" dirty="0"/>
-              <a:t>） </a:t>
+              <a:rPr lang="ja-JP" altLang="en-US" sz="2000" dirty="0" smtClean="0"/>
+              <a:t>）</a:t>
+            </a:r>
+            <a:r>
+              <a:rPr lang="en-US" altLang="ja-JP" sz="2400" dirty="0" smtClean="0">
+                <a:solidFill>
+                  <a:srgbClr val="FF0000"/>
+                </a:solidFill>
+              </a:rPr>
+              <a:t>&lt;strong&gt;</a:t>
+            </a:r>
+            <a:r>
+              <a:rPr lang="en-US" altLang="ja-JP" sz="1600" dirty="0" smtClean="0"/>
+              <a:t>[</a:t>
+            </a:r>
+            <a:r>
+              <a:rPr lang="ja-JP" altLang="en-US" sz="1600" dirty="0"/>
+              <a:t>第</a:t>
+            </a:r>
+            <a:r>
+              <a:rPr lang="en-US" altLang="ja-JP" sz="1600" dirty="0"/>
+              <a:t>3</a:t>
+            </a:r>
+            <a:r>
+              <a:rPr lang="ja-JP" altLang="en-US" sz="1600" dirty="0"/>
+              <a:t>回レポート課題</a:t>
+            </a:r>
+            <a:r>
+              <a:rPr lang="en-US" altLang="ja-JP" sz="1600" dirty="0"/>
+              <a:t>]</a:t>
             </a:r>
             <a:r>
               <a:rPr lang="en-US" altLang="ja-JP" sz="2000" dirty="0"/>
-              <a:t>[</a:t>
-            </a:r>
-            <a:r>
-              <a:rPr lang="ja-JP" altLang="en-US" sz="2000" dirty="0"/>
-              <a:t>第</a:t>
-            </a:r>
-            <a:r>
-              <a:rPr lang="en-US" altLang="ja-JP" sz="2000" dirty="0"/>
-              <a:t>3</a:t>
-            </a:r>
-            <a:r>
-              <a:rPr lang="ja-JP" altLang="en-US" sz="2000" dirty="0"/>
-              <a:t>回レポート課題</a:t>
-            </a:r>
-            <a:r>
-              <a:rPr lang="en-US" altLang="ja-JP" sz="2000" dirty="0"/>
-              <a:t>] </a:t>
-            </a:r>
-            <a:r>
-              <a:rPr lang="en-US" altLang="ja-JP" sz="2000" dirty="0">
+              <a:t> </a:t>
+            </a:r>
+            <a:r>
+              <a:rPr lang="en-US" altLang="ja-JP" sz="2400" dirty="0">
                 <a:solidFill>
                   <a:srgbClr val="FF0000"/>
                 </a:solidFill>
@@ -7974,14 +7991,14 @@
               <a:t>&lt;/strong&gt;&lt;/li</a:t>
             </a:r>
             <a:r>
-              <a:rPr lang="en-US" altLang="ja-JP" sz="2000" dirty="0" smtClean="0">
+              <a:rPr lang="en-US" altLang="ja-JP" sz="2400" dirty="0" smtClean="0">
                 <a:solidFill>
                   <a:srgbClr val="FF0000"/>
                 </a:solidFill>
               </a:rPr>
               <a:t>&gt;</a:t>
             </a:r>
-            <a:endParaRPr lang="en-US" altLang="ja-JP" sz="2000" dirty="0"/>
+            <a:endParaRPr lang="en-US" altLang="ja-JP" sz="2400" dirty="0"/>
           </a:p>
           <a:p>
             <a:pPr marL="0" indent="0">
@@ -13221,11 +13238,7 @@
             </a:r>
             <a:r>
               <a:rPr lang="ja-JP" altLang="en-US" dirty="0" smtClean="0"/>
-              <a:t>化けは基本的</a:t>
-            </a:r>
-            <a:r>
-              <a:rPr lang="ja-JP" altLang="en-US" dirty="0" smtClean="0"/>
-              <a:t>に符号化方式（エンコーディング）の解釈の違いでおきます。</a:t>
+              <a:t>化けは基本的に符号化方式（エンコーディング）の解釈の違いでおきます。</a:t>
             </a:r>
             <a:endParaRPr lang="en-US" altLang="ja-JP" dirty="0" smtClean="0"/>
           </a:p>
@@ -13280,19 +13293,7 @@
             </a:r>
             <a:r>
               <a:rPr lang="ja-JP" altLang="en-US" dirty="0" smtClean="0"/>
-              <a:t>である</a:t>
-            </a:r>
-            <a:r>
-              <a:rPr lang="ja-JP" altLang="en-US" dirty="0" smtClean="0"/>
-              <a:t>場合、最終</a:t>
-            </a:r>
-            <a:r>
-              <a:rPr lang="ja-JP" altLang="en-US" dirty="0" smtClean="0"/>
-              <a:t>評価</a:t>
-            </a:r>
-            <a:r>
-              <a:rPr lang="ja-JP" altLang="en-US" dirty="0" smtClean="0"/>
-              <a:t>は「</a:t>
+              <a:t>である場合、最終評価は「</a:t>
             </a:r>
             <a:r>
               <a:rPr lang="en-US" altLang="ja-JP" dirty="0" smtClean="0"/>
@@ -13300,11 +13301,7 @@
             </a:r>
             <a:r>
               <a:rPr lang="ja-JP" altLang="en-US" dirty="0" smtClean="0"/>
-              <a:t>」と</a:t>
-            </a:r>
-            <a:r>
-              <a:rPr lang="ja-JP" altLang="en-US" dirty="0" smtClean="0"/>
-              <a:t>なるはずです。</a:t>
+              <a:t>」となるはずです。</a:t>
             </a:r>
             <a:endParaRPr lang="en-US" altLang="ja-JP" dirty="0" smtClean="0"/>
           </a:p>

</xml_diff>